<commit_message>
Lots of added features and bug fixes
</commit_message>
<xml_diff>
--- a/images/PrincipleArchitecture.pptx
+++ b/images/PrincipleArchitecture.pptx
@@ -104,7 +104,57 @@
       </a:defRPr>
     </a:lvl9pPr>
   </p:defaultTextStyle>
+  <p:extLst>
+    <p:ext uri="{EFAFB233-063F-42B5-8137-9DF3F51BA10A}">
+      <p15:sldGuideLst xmlns:p15="http://schemas.microsoft.com/office/powerpoint/2012/main"/>
+    </p:ext>
+  </p:extLst>
 </p:presentation>
+</file>
+
+<file path=ppt/changesInfos/changesInfo1.xml><?xml version="1.0" encoding="utf-8"?>
+<pc:chgInfo xmlns:a="http://schemas.openxmlformats.org/drawingml/2006/main" xmlns:r="http://schemas.openxmlformats.org/officeDocument/2006/relationships" xmlns:ac="http://schemas.microsoft.com/office/drawing/2013/main/command" xmlns:pc="http://schemas.microsoft.com/office/powerpoint/2013/main/command">
+  <pc:docChgLst>
+    <pc:chgData name="Thomas Stolt" userId="d89bd5ff47ebf7c5" providerId="LiveId" clId="{4E222322-17C9-3847-B24A-B443C0E849D0}"/>
+    <pc:docChg chg="custSel modSld">
+      <pc:chgData name="Thomas Stolt" userId="d89bd5ff47ebf7c5" providerId="LiveId" clId="{4E222322-17C9-3847-B24A-B443C0E849D0}" dt="2023-12-27T11:04:35.686" v="62" actId="1036"/>
+      <pc:docMkLst>
+        <pc:docMk/>
+      </pc:docMkLst>
+      <pc:sldChg chg="delSp modSp mod">
+        <pc:chgData name="Thomas Stolt" userId="d89bd5ff47ebf7c5" providerId="LiveId" clId="{4E222322-17C9-3847-B24A-B443C0E849D0}" dt="2023-12-27T11:04:35.686" v="62" actId="1036"/>
+        <pc:sldMkLst>
+          <pc:docMk/>
+          <pc:sldMk cId="588767186" sldId="256"/>
+        </pc:sldMkLst>
+        <pc:spChg chg="mod">
+          <ac:chgData name="Thomas Stolt" userId="d89bd5ff47ebf7c5" providerId="LiveId" clId="{4E222322-17C9-3847-B24A-B443C0E849D0}" dt="2023-12-27T11:04:29.618" v="39" actId="14100"/>
+          <ac:spMkLst>
+            <pc:docMk/>
+            <pc:sldMk cId="588767186" sldId="256"/>
+            <ac:spMk id="23" creationId="{4990D812-21F1-4ED0-B1C4-1611E2A18E94}"/>
+          </ac:spMkLst>
+        </pc:spChg>
+        <pc:spChg chg="del mod">
+          <ac:chgData name="Thomas Stolt" userId="d89bd5ff47ebf7c5" providerId="LiveId" clId="{4E222322-17C9-3847-B24A-B443C0E849D0}" dt="2023-12-27T11:03:54.882" v="13" actId="478"/>
+          <ac:spMkLst>
+            <pc:docMk/>
+            <pc:sldMk cId="588767186" sldId="256"/>
+            <ac:spMk id="24" creationId="{6DFC86C8-E372-EDD5-B598-E49B52332063}"/>
+          </ac:spMkLst>
+        </pc:spChg>
+        <pc:spChg chg="mod">
+          <ac:chgData name="Thomas Stolt" userId="d89bd5ff47ebf7c5" providerId="LiveId" clId="{4E222322-17C9-3847-B24A-B443C0E849D0}" dt="2023-12-27T11:04:35.686" v="62" actId="1036"/>
+          <ac:spMkLst>
+            <pc:docMk/>
+            <pc:sldMk cId="588767186" sldId="256"/>
+            <ac:spMk id="27" creationId="{04B3B152-AD13-1DC6-4DED-DF4BB5A923F9}"/>
+          </ac:spMkLst>
+        </pc:spChg>
+      </pc:sldChg>
+    </pc:docChg>
+  </pc:docChgLst>
+</pc:chgInfo>
 </file>
 
 <file path=ppt/slideLayouts/slideLayout1.xml><?xml version="1.0" encoding="utf-8"?>
@@ -254,7 +304,7 @@
           <a:p>
             <a:fld id="{22FB68C6-E3E1-6342-8C42-7E14A771502B}" type="datetimeFigureOut">
               <a:rPr lang="de-DE" smtClean="0"/>
-              <a:t>12.12.23</a:t>
+              <a:t>27.12.23</a:t>
             </a:fld>
             <a:endParaRPr lang="de-DE"/>
           </a:p>
@@ -452,7 +502,7 @@
           <a:p>
             <a:fld id="{22FB68C6-E3E1-6342-8C42-7E14A771502B}" type="datetimeFigureOut">
               <a:rPr lang="de-DE" smtClean="0"/>
-              <a:t>12.12.23</a:t>
+              <a:t>27.12.23</a:t>
             </a:fld>
             <a:endParaRPr lang="de-DE"/>
           </a:p>
@@ -660,7 +710,7 @@
           <a:p>
             <a:fld id="{22FB68C6-E3E1-6342-8C42-7E14A771502B}" type="datetimeFigureOut">
               <a:rPr lang="de-DE" smtClean="0"/>
-              <a:t>12.12.23</a:t>
+              <a:t>27.12.23</a:t>
             </a:fld>
             <a:endParaRPr lang="de-DE"/>
           </a:p>
@@ -858,7 +908,7 @@
           <a:p>
             <a:fld id="{22FB68C6-E3E1-6342-8C42-7E14A771502B}" type="datetimeFigureOut">
               <a:rPr lang="de-DE" smtClean="0"/>
-              <a:t>12.12.23</a:t>
+              <a:t>27.12.23</a:t>
             </a:fld>
             <a:endParaRPr lang="de-DE"/>
           </a:p>
@@ -1133,7 +1183,7 @@
           <a:p>
             <a:fld id="{22FB68C6-E3E1-6342-8C42-7E14A771502B}" type="datetimeFigureOut">
               <a:rPr lang="de-DE" smtClean="0"/>
-              <a:t>12.12.23</a:t>
+              <a:t>27.12.23</a:t>
             </a:fld>
             <a:endParaRPr lang="de-DE"/>
           </a:p>
@@ -1398,7 +1448,7 @@
           <a:p>
             <a:fld id="{22FB68C6-E3E1-6342-8C42-7E14A771502B}" type="datetimeFigureOut">
               <a:rPr lang="de-DE" smtClean="0"/>
-              <a:t>12.12.23</a:t>
+              <a:t>27.12.23</a:t>
             </a:fld>
             <a:endParaRPr lang="de-DE"/>
           </a:p>
@@ -1810,7 +1860,7 @@
           <a:p>
             <a:fld id="{22FB68C6-E3E1-6342-8C42-7E14A771502B}" type="datetimeFigureOut">
               <a:rPr lang="de-DE" smtClean="0"/>
-              <a:t>12.12.23</a:t>
+              <a:t>27.12.23</a:t>
             </a:fld>
             <a:endParaRPr lang="de-DE"/>
           </a:p>
@@ -1951,7 +2001,7 @@
           <a:p>
             <a:fld id="{22FB68C6-E3E1-6342-8C42-7E14A771502B}" type="datetimeFigureOut">
               <a:rPr lang="de-DE" smtClean="0"/>
-              <a:t>12.12.23</a:t>
+              <a:t>27.12.23</a:t>
             </a:fld>
             <a:endParaRPr lang="de-DE"/>
           </a:p>
@@ -2064,7 +2114,7 @@
           <a:p>
             <a:fld id="{22FB68C6-E3E1-6342-8C42-7E14A771502B}" type="datetimeFigureOut">
               <a:rPr lang="de-DE" smtClean="0"/>
-              <a:t>12.12.23</a:t>
+              <a:t>27.12.23</a:t>
             </a:fld>
             <a:endParaRPr lang="de-DE"/>
           </a:p>
@@ -2375,7 +2425,7 @@
           <a:p>
             <a:fld id="{22FB68C6-E3E1-6342-8C42-7E14A771502B}" type="datetimeFigureOut">
               <a:rPr lang="de-DE" smtClean="0"/>
-              <a:t>12.12.23</a:t>
+              <a:t>27.12.23</a:t>
             </a:fld>
             <a:endParaRPr lang="de-DE"/>
           </a:p>
@@ -2663,7 +2713,7 @@
           <a:p>
             <a:fld id="{22FB68C6-E3E1-6342-8C42-7E14A771502B}" type="datetimeFigureOut">
               <a:rPr lang="de-DE" smtClean="0"/>
-              <a:t>12.12.23</a:t>
+              <a:t>27.12.23</a:t>
             </a:fld>
             <a:endParaRPr lang="de-DE"/>
           </a:p>
@@ -2904,7 +2954,7 @@
           <a:p>
             <a:fld id="{22FB68C6-E3E1-6342-8C42-7E14A771502B}" type="datetimeFigureOut">
               <a:rPr lang="de-DE" smtClean="0"/>
-              <a:t>12.12.23</a:t>
+              <a:t>27.12.23</a:t>
             </a:fld>
             <a:endParaRPr lang="de-DE"/>
           </a:p>
@@ -3932,8 +3982,8 @@
         </p:nvSpPr>
         <p:spPr>
           <a:xfrm>
-            <a:off x="6646741" y="3590306"/>
-            <a:ext cx="2402665" cy="913349"/>
+            <a:off x="6646741" y="3102428"/>
+            <a:ext cx="2402665" cy="1621972"/>
           </a:xfrm>
           <a:prstGeom prst="flowChartMagneticDisk">
             <a:avLst/>
@@ -3961,63 +4011,20 @@
           <a:p>
             <a:pPr algn="ctr"/>
             <a:r>
+              <a:rPr lang="de-DE" i="1" dirty="0"/>
+              <a:t>MQTT Broker Plugin</a:t>
+            </a:r>
+            <a:br>
+              <a:rPr lang="de-DE" i="1" dirty="0"/>
+            </a:br>
+            <a:br>
+              <a:rPr lang="de-DE" dirty="0"/>
+            </a:br>
+            <a:r>
               <a:rPr lang="de-DE" dirty="0" err="1"/>
               <a:t>ioBroker</a:t>
             </a:r>
             <a:endParaRPr lang="de-DE" dirty="0"/>
-          </a:p>
-        </p:txBody>
-      </p:sp>
-      <p:sp>
-        <p:nvSpPr>
-          <p:cNvPr id="24" name="Magnetplattenspeicher 23">
-            <a:extLst>
-              <a:ext uri="{FF2B5EF4-FFF2-40B4-BE49-F238E27FC236}">
-                <a16:creationId xmlns:a16="http://schemas.microsoft.com/office/drawing/2014/main" id="{6DFC86C8-E372-EDD5-B598-E49B52332063}"/>
-              </a:ext>
-            </a:extLst>
-          </p:cNvPr>
-          <p:cNvSpPr/>
-          <p:nvPr/>
-        </p:nvSpPr>
-        <p:spPr>
-          <a:xfrm>
-            <a:off x="6646740" y="3010561"/>
-            <a:ext cx="2402665" cy="913349"/>
-          </a:xfrm>
-          <a:prstGeom prst="flowChartMagneticDisk">
-            <a:avLst/>
-          </a:prstGeom>
-        </p:spPr>
-        <p:style>
-          <a:lnRef idx="2">
-            <a:schemeClr val="accent1">
-              <a:shade val="15000"/>
-            </a:schemeClr>
-          </a:lnRef>
-          <a:fillRef idx="1">
-            <a:schemeClr val="accent1"/>
-          </a:fillRef>
-          <a:effectRef idx="0">
-            <a:schemeClr val="accent1"/>
-          </a:effectRef>
-          <a:fontRef idx="minor">
-            <a:schemeClr val="lt1"/>
-          </a:fontRef>
-        </p:style>
-        <p:txBody>
-          <a:bodyPr rtlCol="0" anchor="ctr"/>
-          <a:lstStyle/>
-          <a:p>
-            <a:pPr algn="ctr"/>
-            <a:r>
-              <a:rPr lang="de-DE" dirty="0" err="1"/>
-              <a:t>Sonoff</a:t>
-            </a:r>
-            <a:r>
-              <a:rPr lang="de-DE" dirty="0"/>
-              <a:t> Plugin</a:t>
-            </a:r>
           </a:p>
         </p:txBody>
       </p:sp>
@@ -4135,7 +4142,7 @@
         </p:nvSpPr>
         <p:spPr>
           <a:xfrm rot="16200000">
-            <a:off x="6853339" y="5130726"/>
+            <a:off x="6755366" y="5337557"/>
             <a:ext cx="2125192" cy="573865"/>
           </a:xfrm>
           <a:prstGeom prst="rightArrow">

</xml_diff>